<commit_message>
Using my version of predator
</commit_message>
<xml_diff>
--- a/predator/figure/DefaultsPaper.pptx
+++ b/predator/figure/DefaultsPaper.pptx
@@ -11,6 +11,7 @@
     <p:sldId id="262" r:id="rId5"/>
     <p:sldId id="260" r:id="rId6"/>
     <p:sldId id="259" r:id="rId7"/>
+    <p:sldId id="263" r:id="rId8"/>
   </p:sldIdLst>
   <p:sldSz cx="9144000" cy="6858000" type="screen4x3"/>
   <p:notesSz cx="6858000" cy="9144000"/>
@@ -146,9 +147,9 @@
           </c:spPr>
           <c:cat>
             <c:strRef>
-              <c:f>Performance!$E$2:$E$21</c:f>
+              <c:f>Performance!$E$2:$E$28</c:f>
               <c:strCache>
-                <c:ptCount val="20"/>
+                <c:ptCount val="27"/>
                 <c:pt idx="0">
                   <c:v>Phoenix</c:v>
                 </c:pt>
@@ -203,7 +204,28 @@
                 <c:pt idx="17">
                   <c:v>x264 </c:v>
                 </c:pt>
+                <c:pt idx="18">
+                  <c:v>RealApplications</c:v>
+                </c:pt>
                 <c:pt idx="19">
+                  <c:v>aget</c:v>
+                </c:pt>
+                <c:pt idx="20">
+                  <c:v>Boost</c:v>
+                </c:pt>
+                <c:pt idx="21">
+                  <c:v>Memcached</c:v>
+                </c:pt>
+                <c:pt idx="22">
+                  <c:v>MySQL</c:v>
+                </c:pt>
+                <c:pt idx="23">
+                  <c:v>pbzip2</c:v>
+                </c:pt>
+                <c:pt idx="24">
+                  <c:v>pfscan</c:v>
+                </c:pt>
+                <c:pt idx="26">
                   <c:v>AVERAGE</c:v>
                 </c:pt>
               </c:strCache>
@@ -211,10 +233,10 @@
           </c:cat>
           <c:val>
             <c:numRef>
-              <c:f>Performance!$F$2:$F$21</c:f>
+              <c:f>Performance!$F$2:$F$28</c:f>
               <c:numCache>
                 <c:formatCode>General</c:formatCode>
-                <c:ptCount val="20"/>
+                <c:ptCount val="27"/>
                 <c:pt idx="1">
                   <c:v>1.0</c:v>
                 </c:pt>
@@ -264,6 +286,24 @@
                   <c:v>1.0</c:v>
                 </c:pt>
                 <c:pt idx="19">
+                  <c:v>1.0</c:v>
+                </c:pt>
+                <c:pt idx="20">
+                  <c:v>1.0</c:v>
+                </c:pt>
+                <c:pt idx="21">
+                  <c:v>1.0</c:v>
+                </c:pt>
+                <c:pt idx="22">
+                  <c:v>1.0</c:v>
+                </c:pt>
+                <c:pt idx="23">
+                  <c:v>1.0</c:v>
+                </c:pt>
+                <c:pt idx="24">
+                  <c:v>1.0</c:v>
+                </c:pt>
+                <c:pt idx="26">
                   <c:v>1.0</c:v>
                 </c:pt>
               </c:numCache>
@@ -279,7 +319,7 @@
               <c:strCache>
                 <c:ptCount val="1"/>
                 <c:pt idx="0">
-                  <c:v>DEFAULTS-NoPred</c:v>
+                  <c:v>PREDATOR-NP</c:v>
                 </c:pt>
               </c:strCache>
             </c:strRef>
@@ -292,18 +332,11 @@
               </a:schemeClr>
             </a:solidFill>
           </c:spPr>
-          <c:dLbls>
-            <c:dLbl>
-              <c:idx val="1"/>
-              <c:showVal val="1"/>
-            </c:dLbl>
-            <c:delete val="1"/>
-          </c:dLbls>
           <c:cat>
             <c:strRef>
-              <c:f>Performance!$E$2:$E$21</c:f>
+              <c:f>Performance!$E$2:$E$28</c:f>
               <c:strCache>
-                <c:ptCount val="20"/>
+                <c:ptCount val="27"/>
                 <c:pt idx="0">
                   <c:v>Phoenix</c:v>
                 </c:pt>
@@ -358,7 +391,28 @@
                 <c:pt idx="17">
                   <c:v>x264 </c:v>
                 </c:pt>
+                <c:pt idx="18">
+                  <c:v>RealApplications</c:v>
+                </c:pt>
                 <c:pt idx="19">
+                  <c:v>aget</c:v>
+                </c:pt>
+                <c:pt idx="20">
+                  <c:v>Boost</c:v>
+                </c:pt>
+                <c:pt idx="21">
+                  <c:v>Memcached</c:v>
+                </c:pt>
+                <c:pt idx="22">
+                  <c:v>MySQL</c:v>
+                </c:pt>
+                <c:pt idx="23">
+                  <c:v>pbzip2</c:v>
+                </c:pt>
+                <c:pt idx="24">
+                  <c:v>pfscan</c:v>
+                </c:pt>
+                <c:pt idx="26">
                   <c:v>AVERAGE</c:v>
                 </c:pt>
               </c:strCache>
@@ -366,10 +420,10 @@
           </c:cat>
           <c:val>
             <c:numRef>
-              <c:f>Performance!$G$2:$G$21</c:f>
+              <c:f>Performance!$G$2:$G$28</c:f>
               <c:numCache>
                 <c:formatCode>General</c:formatCode>
-                <c:ptCount val="20"/>
+                <c:ptCount val="27"/>
                 <c:pt idx="1">
                   <c:v>23.43650793719243</c:v>
                 </c:pt>
@@ -398,7 +452,7 @@
                   <c:v>1.216110019634419</c:v>
                 </c:pt>
                 <c:pt idx="11">
-                  <c:v>8.844773789998928</c:v>
+                  <c:v>8.844773789998927</c:v>
                 </c:pt>
                 <c:pt idx="12">
                   <c:v>2.822429906274356</c:v>
@@ -419,7 +473,25 @@
                   <c:v>1.131678189798801</c:v>
                 </c:pt>
                 <c:pt idx="19">
-                  <c:v>6.522449583410472</c:v>
+                  <c:v>0.948430493273543</c:v>
+                </c:pt>
+                <c:pt idx="20">
+                  <c:v>3.98711616930196</c:v>
+                </c:pt>
+                <c:pt idx="21">
+                  <c:v>1.010644706115343</c:v>
+                </c:pt>
+                <c:pt idx="22">
+                  <c:v>2.705889079484208</c:v>
+                </c:pt>
+                <c:pt idx="23">
+                  <c:v>1.001168053718772</c:v>
+                </c:pt>
+                <c:pt idx="24">
+                  <c:v>0.999184172955333</c:v>
+                </c:pt>
+                <c:pt idx="26">
+                  <c:v>5.227801182246214</c:v>
                 </c:pt>
               </c:numCache>
             </c:numRef>
@@ -434,7 +506,7 @@
               <c:strCache>
                 <c:ptCount val="1"/>
                 <c:pt idx="0">
-                  <c:v>DEFAULTS</c:v>
+                  <c:v>PREDATOR</c:v>
                 </c:pt>
               </c:strCache>
             </c:strRef>
@@ -444,18 +516,11 @@
               <a:schemeClr val="tx1"/>
             </a:solidFill>
           </c:spPr>
-          <c:dLbls>
-            <c:dLbl>
-              <c:idx val="1"/>
-              <c:showVal val="1"/>
-            </c:dLbl>
-            <c:delete val="1"/>
-          </c:dLbls>
           <c:cat>
             <c:strRef>
-              <c:f>Performance!$E$2:$E$21</c:f>
+              <c:f>Performance!$E$2:$E$28</c:f>
               <c:strCache>
-                <c:ptCount val="20"/>
+                <c:ptCount val="27"/>
                 <c:pt idx="0">
                   <c:v>Phoenix</c:v>
                 </c:pt>
@@ -510,7 +575,28 @@
                 <c:pt idx="17">
                   <c:v>x264 </c:v>
                 </c:pt>
+                <c:pt idx="18">
+                  <c:v>RealApplications</c:v>
+                </c:pt>
                 <c:pt idx="19">
+                  <c:v>aget</c:v>
+                </c:pt>
+                <c:pt idx="20">
+                  <c:v>Boost</c:v>
+                </c:pt>
+                <c:pt idx="21">
+                  <c:v>Memcached</c:v>
+                </c:pt>
+                <c:pt idx="22">
+                  <c:v>MySQL</c:v>
+                </c:pt>
+                <c:pt idx="23">
+                  <c:v>pbzip2</c:v>
+                </c:pt>
+                <c:pt idx="24">
+                  <c:v>pfscan</c:v>
+                </c:pt>
+                <c:pt idx="26">
                   <c:v>AVERAGE</c:v>
                 </c:pt>
               </c:strCache>
@@ -518,12 +604,12 @@
           </c:cat>
           <c:val>
             <c:numRef>
-              <c:f>Performance!$H$2:$H$21</c:f>
+              <c:f>Performance!$H$2:$H$28</c:f>
               <c:numCache>
                 <c:formatCode>General</c:formatCode>
-                <c:ptCount val="20"/>
+                <c:ptCount val="27"/>
                 <c:pt idx="1">
-                  <c:v>26.52222222312382</c:v>
+                  <c:v>26.52222222312381</c:v>
                 </c:pt>
                 <c:pt idx="2">
                   <c:v>12.0924349306738</c:v>
@@ -553,16 +639,16 @@
                   <c:v>8.872074882102456</c:v>
                 </c:pt>
                 <c:pt idx="12">
-                  <c:v>2.859813083874574</c:v>
+                  <c:v>2.859813083874573</c:v>
                 </c:pt>
                 <c:pt idx="13">
                   <c:v>11.65280801059046</c:v>
                 </c:pt>
                 <c:pt idx="14">
-                  <c:v>5.114902506457724</c:v>
+                  <c:v>5.114902506457723</c:v>
                 </c:pt>
                 <c:pt idx="15">
-                  <c:v>5.875053856062042</c:v>
+                  <c:v>5.875053856062041</c:v>
                 </c:pt>
                 <c:pt idx="16">
                   <c:v>10.59282108800632</c:v>
@@ -571,17 +657,35 @@
                   <c:v>1.155248271480525</c:v>
                 </c:pt>
                 <c:pt idx="19">
-                  <c:v>6.699413487025245</c:v>
+                  <c:v>1.02493273542601</c:v>
+                </c:pt>
+                <c:pt idx="20">
+                  <c:v>3.980030062366072</c:v>
+                </c:pt>
+                <c:pt idx="21">
+                  <c:v>1.033006840667728</c:v>
+                </c:pt>
+                <c:pt idx="22">
+                  <c:v>2.717324185270465</c:v>
+                </c:pt>
+                <c:pt idx="23">
+                  <c:v>1.011680537302189</c:v>
+                </c:pt>
+                <c:pt idx="24">
+                  <c:v>0.997654497238425</c:v>
+                </c:pt>
+                <c:pt idx="26">
+                  <c:v>5.361602029576126</c:v>
                 </c:pt>
               </c:numCache>
             </c:numRef>
           </c:val>
         </c:ser>
-        <c:axId val="250798472"/>
-        <c:axId val="250801688"/>
+        <c:axId val="239207032"/>
+        <c:axId val="239191512"/>
       </c:barChart>
       <c:catAx>
-        <c:axId val="250798472"/>
+        <c:axId val="239207032"/>
         <c:scaling>
           <c:orientation val="minMax"/>
         </c:scaling>
@@ -597,40 +701,60 @@
             <a:endParaRPr lang="en-US"/>
           </a:p>
         </c:txPr>
-        <c:crossAx val="250801688"/>
+        <c:crossAx val="239191512"/>
         <c:crosses val="autoZero"/>
         <c:auto val="1"/>
         <c:lblAlgn val="ctr"/>
         <c:lblOffset val="100"/>
       </c:catAx>
       <c:valAx>
-        <c:axId val="250801688"/>
+        <c:axId val="239191512"/>
         <c:scaling>
           <c:orientation val="minMax"/>
-          <c:max val="16.0"/>
+          <c:max val="15.0"/>
+          <c:min val="0.0"/>
         </c:scaling>
         <c:axPos val="l"/>
         <c:majorGridlines/>
+        <c:title>
+          <c:tx>
+            <c:rich>
+              <a:bodyPr/>
+              <a:lstStyle/>
+              <a:p>
+                <a:pPr>
+                  <a:defRPr sz="1200"/>
+                </a:pPr>
+                <a:r>
+                  <a:rPr lang="en-US" sz="1200"/>
+                  <a:t>Normalized Runtime</a:t>
+                </a:r>
+              </a:p>
+            </c:rich>
+          </c:tx>
+          <c:layout/>
+        </c:title>
         <c:numFmt formatCode="General" sourceLinked="1"/>
         <c:tickLblPos val="nextTo"/>
-        <c:crossAx val="250798472"/>
+        <c:crossAx val="239207032"/>
         <c:crosses val="autoZero"/>
         <c:crossBetween val="between"/>
-        <c:majorUnit val="2.0"/>
+        <c:majorUnit val="3.0"/>
       </c:valAx>
     </c:plotArea>
     <c:legend>
       <c:legendPos val="r"/>
-      <c:layout>
-        <c:manualLayout>
-          <c:xMode val="edge"/>
-          <c:yMode val="edge"/>
-          <c:x val="0.802110922214269"/>
-          <c:y val="0.252138446722937"/>
-          <c:w val="0.17137392627058"/>
-          <c:h val="0.243924191355577"/>
-        </c:manualLayout>
-      </c:layout>
+      <c:layout/>
+      <c:txPr>
+        <a:bodyPr/>
+        <a:lstStyle/>
+        <a:p>
+          <a:pPr>
+            <a:defRPr b="1"/>
+          </a:pPr>
+          <a:endParaRPr lang="en-US"/>
+        </a:p>
+      </c:txPr>
     </c:legend>
     <c:plotVisOnly val="1"/>
   </c:chart>
@@ -655,158 +779,11 @@
           <c:order val="0"/>
           <c:tx>
             <c:strRef>
-              <c:f>Performance!$F$1</c:f>
+              <c:f>MemoryUsage!$E$1</c:f>
               <c:strCache>
                 <c:ptCount val="1"/>
                 <c:pt idx="0">
                   <c:v>Original</c:v>
-                </c:pt>
-              </c:strCache>
-            </c:strRef>
-          </c:tx>
-          <c:spPr>
-            <a:solidFill>
-              <a:schemeClr val="bg1">
-                <a:lumMod val="50000"/>
-              </a:schemeClr>
-            </a:solidFill>
-          </c:spPr>
-          <c:cat>
-            <c:strRef>
-              <c:f>Performance!$E$2:$E$21</c:f>
-              <c:strCache>
-                <c:ptCount val="20"/>
-                <c:pt idx="0">
-                  <c:v>Phoenix</c:v>
-                </c:pt>
-                <c:pt idx="1">
-                  <c:v>histogram</c:v>
-                </c:pt>
-                <c:pt idx="2">
-                  <c:v>kmeans</c:v>
-                </c:pt>
-                <c:pt idx="3">
-                  <c:v>linear_regression</c:v>
-                </c:pt>
-                <c:pt idx="4">
-                  <c:v>matrix_multiply</c:v>
-                </c:pt>
-                <c:pt idx="5">
-                  <c:v>pca</c:v>
-                </c:pt>
-                <c:pt idx="6">
-                  <c:v>reverse_index</c:v>
-                </c:pt>
-                <c:pt idx="7">
-                  <c:v>string_match</c:v>
-                </c:pt>
-                <c:pt idx="8">
-                  <c:v>word_count</c:v>
-                </c:pt>
-                <c:pt idx="9">
-                  <c:v>PARSEC</c:v>
-                </c:pt>
-                <c:pt idx="10">
-                  <c:v>blackscholes </c:v>
-                </c:pt>
-                <c:pt idx="11">
-                  <c:v>bodytrack </c:v>
-                </c:pt>
-                <c:pt idx="12">
-                  <c:v>dedup </c:v>
-                </c:pt>
-                <c:pt idx="13">
-                  <c:v>ferret </c:v>
-                </c:pt>
-                <c:pt idx="14">
-                  <c:v>fluidanimate </c:v>
-                </c:pt>
-                <c:pt idx="15">
-                  <c:v>streamcluster </c:v>
-                </c:pt>
-                <c:pt idx="16">
-                  <c:v>swaptions </c:v>
-                </c:pt>
-                <c:pt idx="17">
-                  <c:v>x264 </c:v>
-                </c:pt>
-                <c:pt idx="19">
-                  <c:v>AVERAGE</c:v>
-                </c:pt>
-              </c:strCache>
-            </c:strRef>
-          </c:cat>
-          <c:val>
-            <c:numRef>
-              <c:f>Performance!$F$2:$F$21</c:f>
-              <c:numCache>
-                <c:formatCode>General</c:formatCode>
-                <c:ptCount val="20"/>
-                <c:pt idx="1">
-                  <c:v>1.0</c:v>
-                </c:pt>
-                <c:pt idx="2">
-                  <c:v>1.0</c:v>
-                </c:pt>
-                <c:pt idx="3">
-                  <c:v>1.0</c:v>
-                </c:pt>
-                <c:pt idx="4">
-                  <c:v>1.0</c:v>
-                </c:pt>
-                <c:pt idx="5">
-                  <c:v>1.0</c:v>
-                </c:pt>
-                <c:pt idx="6">
-                  <c:v>1.0</c:v>
-                </c:pt>
-                <c:pt idx="7">
-                  <c:v>1.0</c:v>
-                </c:pt>
-                <c:pt idx="8">
-                  <c:v>1.0</c:v>
-                </c:pt>
-                <c:pt idx="10">
-                  <c:v>1.0</c:v>
-                </c:pt>
-                <c:pt idx="11">
-                  <c:v>1.0</c:v>
-                </c:pt>
-                <c:pt idx="12">
-                  <c:v>1.0</c:v>
-                </c:pt>
-                <c:pt idx="13">
-                  <c:v>1.0</c:v>
-                </c:pt>
-                <c:pt idx="14">
-                  <c:v>1.0</c:v>
-                </c:pt>
-                <c:pt idx="15">
-                  <c:v>1.0</c:v>
-                </c:pt>
-                <c:pt idx="16">
-                  <c:v>1.0</c:v>
-                </c:pt>
-                <c:pt idx="17">
-                  <c:v>1.0</c:v>
-                </c:pt>
-                <c:pt idx="19">
-                  <c:v>1.0</c:v>
-                </c:pt>
-              </c:numCache>
-            </c:numRef>
-          </c:val>
-        </c:ser>
-        <c:ser>
-          <c:idx val="1"/>
-          <c:order val="1"/>
-          <c:tx>
-            <c:strRef>
-              <c:f>Performance!$G$1</c:f>
-              <c:strCache>
-                <c:ptCount val="1"/>
-                <c:pt idx="0">
-                  <c:v>DEFAULTS-NoPred</c:v>
                 </c:pt>
               </c:strCache>
             </c:strRef>
@@ -814,16 +791,16 @@
           <c:spPr>
             <a:solidFill>
               <a:schemeClr val="tx1">
-                <a:lumMod val="65000"/>
-                <a:lumOff val="35000"/>
+                <a:lumMod val="50000"/>
+                <a:lumOff val="50000"/>
               </a:schemeClr>
             </a:solidFill>
           </c:spPr>
           <c:cat>
             <c:strRef>
-              <c:f>Performance!$E$2:$E$21</c:f>
+              <c:f>MemoryUsage!$D$2:$D$28</c:f>
               <c:strCache>
-                <c:ptCount val="20"/>
+                <c:ptCount val="27"/>
                 <c:pt idx="0">
                   <c:v>Phoenix</c:v>
                 </c:pt>
@@ -878,7 +855,28 @@
                 <c:pt idx="17">
                   <c:v>x264 </c:v>
                 </c:pt>
+                <c:pt idx="18">
+                  <c:v>RealApplications</c:v>
+                </c:pt>
                 <c:pt idx="19">
+                  <c:v>aget</c:v>
+                </c:pt>
+                <c:pt idx="20">
+                  <c:v>Boost</c:v>
+                </c:pt>
+                <c:pt idx="21">
+                  <c:v>Memcached</c:v>
+                </c:pt>
+                <c:pt idx="22">
+                  <c:v>MySQL</c:v>
+                </c:pt>
+                <c:pt idx="23">
+                  <c:v>pbzip2</c:v>
+                </c:pt>
+                <c:pt idx="24">
+                  <c:v>pfscan</c:v>
+                </c:pt>
+                <c:pt idx="26">
                   <c:v>AVERAGE</c:v>
                 </c:pt>
               </c:strCache>
@@ -886,402 +884,10 @@
           </c:cat>
           <c:val>
             <c:numRef>
-              <c:f>Performance!$G$2:$G$21</c:f>
+              <c:f>MemoryUsage!$E$2:$E$28</c:f>
               <c:numCache>
                 <c:formatCode>General</c:formatCode>
-                <c:ptCount val="20"/>
-                <c:pt idx="1">
-                  <c:v>23.43650793719243</c:v>
-                </c:pt>
-                <c:pt idx="2">
-                  <c:v>12.30162977377767</c:v>
-                </c:pt>
-                <c:pt idx="3">
-                  <c:v>3.246626091537444</c:v>
-                </c:pt>
-                <c:pt idx="4">
-                  <c:v>1.451512905174464</c:v>
-                </c:pt>
-                <c:pt idx="5">
-                  <c:v>3.585815338811545</c:v>
-                </c:pt>
-                <c:pt idx="6">
-                  <c:v>6.97308367472883</c:v>
-                </c:pt>
-                <c:pt idx="7">
-                  <c:v>2.454966546504829</c:v>
-                </c:pt>
-                <c:pt idx="8">
-                  <c:v>3.449282296735483</c:v>
-                </c:pt>
-                <c:pt idx="10">
-                  <c:v>1.216110019634419</c:v>
-                </c:pt>
-                <c:pt idx="11">
-                  <c:v>8.844773789998928</c:v>
-                </c:pt>
-                <c:pt idx="12">
-                  <c:v>2.822429906274356</c:v>
-                </c:pt>
-                <c:pt idx="13">
-                  <c:v>11.87440139326621</c:v>
-                </c:pt>
-                <c:pt idx="14">
-                  <c:v>5.115598885399166</c:v>
-                </c:pt>
-                <c:pt idx="15">
-                  <c:v>5.878500646307626</c:v>
-                </c:pt>
-                <c:pt idx="16">
-                  <c:v>10.57627593942535</c:v>
-                </c:pt>
-                <c:pt idx="17">
-                  <c:v>1.131678189798801</c:v>
-                </c:pt>
-                <c:pt idx="19">
-                  <c:v>6.522449583410472</c:v>
-                </c:pt>
-              </c:numCache>
-            </c:numRef>
-          </c:val>
-        </c:ser>
-        <c:ser>
-          <c:idx val="2"/>
-          <c:order val="2"/>
-          <c:tx>
-            <c:strRef>
-              <c:f>Performance!$H$1</c:f>
-              <c:strCache>
-                <c:ptCount val="1"/>
-                <c:pt idx="0">
-                  <c:v>DEFAULTS</c:v>
-                </c:pt>
-              </c:strCache>
-            </c:strRef>
-          </c:tx>
-          <c:spPr>
-            <a:solidFill>
-              <a:schemeClr val="tx1"/>
-            </a:solidFill>
-          </c:spPr>
-          <c:cat>
-            <c:strRef>
-              <c:f>Performance!$E$2:$E$21</c:f>
-              <c:strCache>
-                <c:ptCount val="20"/>
-                <c:pt idx="0">
-                  <c:v>Phoenix</c:v>
-                </c:pt>
-                <c:pt idx="1">
-                  <c:v>histogram</c:v>
-                </c:pt>
-                <c:pt idx="2">
-                  <c:v>kmeans</c:v>
-                </c:pt>
-                <c:pt idx="3">
-                  <c:v>linear_regression</c:v>
-                </c:pt>
-                <c:pt idx="4">
-                  <c:v>matrix_multiply</c:v>
-                </c:pt>
-                <c:pt idx="5">
-                  <c:v>pca</c:v>
-                </c:pt>
-                <c:pt idx="6">
-                  <c:v>reverse_index</c:v>
-                </c:pt>
-                <c:pt idx="7">
-                  <c:v>string_match</c:v>
-                </c:pt>
-                <c:pt idx="8">
-                  <c:v>word_count</c:v>
-                </c:pt>
-                <c:pt idx="9">
-                  <c:v>PARSEC</c:v>
-                </c:pt>
-                <c:pt idx="10">
-                  <c:v>blackscholes </c:v>
-                </c:pt>
-                <c:pt idx="11">
-                  <c:v>bodytrack </c:v>
-                </c:pt>
-                <c:pt idx="12">
-                  <c:v>dedup </c:v>
-                </c:pt>
-                <c:pt idx="13">
-                  <c:v>ferret </c:v>
-                </c:pt>
-                <c:pt idx="14">
-                  <c:v>fluidanimate </c:v>
-                </c:pt>
-                <c:pt idx="15">
-                  <c:v>streamcluster </c:v>
-                </c:pt>
-                <c:pt idx="16">
-                  <c:v>swaptions </c:v>
-                </c:pt>
-                <c:pt idx="17">
-                  <c:v>x264 </c:v>
-                </c:pt>
-                <c:pt idx="19">
-                  <c:v>AVERAGE</c:v>
-                </c:pt>
-              </c:strCache>
-            </c:strRef>
-          </c:cat>
-          <c:val>
-            <c:numRef>
-              <c:f>Performance!$H$2:$H$21</c:f>
-              <c:numCache>
-                <c:formatCode>General</c:formatCode>
-                <c:ptCount val="20"/>
-                <c:pt idx="1">
-                  <c:v>26.52222222312382</c:v>
-                </c:pt>
-                <c:pt idx="2">
-                  <c:v>12.0924349306738</c:v>
-                </c:pt>
-                <c:pt idx="3">
-                  <c:v>3.254829319925906</c:v>
-                </c:pt>
-                <c:pt idx="4">
-                  <c:v>1.465260462287403</c:v>
-                </c:pt>
-                <c:pt idx="5">
-                  <c:v>3.587118391683232</c:v>
-                </c:pt>
-                <c:pt idx="6">
-                  <c:v>6.977179637233256</c:v>
-                </c:pt>
-                <c:pt idx="7">
-                  <c:v>2.522388059606056</c:v>
-                </c:pt>
-                <c:pt idx="8">
-                  <c:v>3.43157894749099</c:v>
-                </c:pt>
-                <c:pt idx="10">
-                  <c:v>1.214882121805355</c:v>
-                </c:pt>
-                <c:pt idx="11">
-                  <c:v>8.872074882102456</c:v>
-                </c:pt>
-                <c:pt idx="12">
-                  <c:v>2.859813083874574</c:v>
-                </c:pt>
-                <c:pt idx="13">
-                  <c:v>11.65280801059046</c:v>
-                </c:pt>
-                <c:pt idx="14">
-                  <c:v>5.114902506457724</c:v>
-                </c:pt>
-                <c:pt idx="15">
-                  <c:v>5.875053856062042</c:v>
-                </c:pt>
-                <c:pt idx="16">
-                  <c:v>10.59282108800632</c:v>
-                </c:pt>
-                <c:pt idx="17">
-                  <c:v>1.155248271480525</c:v>
-                </c:pt>
-                <c:pt idx="19">
-                  <c:v>6.699413487025245</c:v>
-                </c:pt>
-              </c:numCache>
-            </c:numRef>
-          </c:val>
-        </c:ser>
-        <c:axId val="458332920"/>
-        <c:axId val="250867592"/>
-      </c:barChart>
-      <c:catAx>
-        <c:axId val="458332920"/>
-        <c:scaling>
-          <c:orientation val="minMax"/>
-        </c:scaling>
-        <c:axPos val="b"/>
-        <c:tickLblPos val="nextTo"/>
-        <c:txPr>
-          <a:bodyPr rot="-2700000"/>
-          <a:lstStyle/>
-          <a:p>
-            <a:pPr>
-              <a:defRPr sz="1000" b="1"/>
-            </a:pPr>
-            <a:endParaRPr lang="en-US"/>
-          </a:p>
-        </c:txPr>
-        <c:crossAx val="250867592"/>
-        <c:crosses val="autoZero"/>
-        <c:auto val="1"/>
-        <c:lblAlgn val="ctr"/>
-        <c:lblOffset val="100"/>
-      </c:catAx>
-      <c:valAx>
-        <c:axId val="250867592"/>
-        <c:scaling>
-          <c:orientation val="minMax"/>
-          <c:max val="16.0"/>
-        </c:scaling>
-        <c:axPos val="l"/>
-        <c:majorGridlines/>
-        <c:title>
-          <c:tx>
-            <c:rich>
-              <a:bodyPr/>
-              <a:lstStyle/>
-              <a:p>
-                <a:pPr>
-                  <a:defRPr/>
-                </a:pPr>
-                <a:r>
-                  <a:rPr lang="en-US"/>
-                  <a:t>Normalized Runtime</a:t>
-                </a:r>
-              </a:p>
-            </c:rich>
-          </c:tx>
-          <c:layout/>
-        </c:title>
-        <c:numFmt formatCode="General" sourceLinked="1"/>
-        <c:tickLblPos val="nextTo"/>
-        <c:crossAx val="458332920"/>
-        <c:crosses val="autoZero"/>
-        <c:crossBetween val="between"/>
-        <c:majorUnit val="2.0"/>
-      </c:valAx>
-    </c:plotArea>
-    <c:legend>
-      <c:legendPos val="r"/>
-      <c:layout>
-        <c:manualLayout>
-          <c:xMode val="edge"/>
-          <c:yMode val="edge"/>
-          <c:x val="0.805898801002147"/>
-          <c:y val="0.256634849600634"/>
-          <c:w val="0.17137392627058"/>
-          <c:h val="0.243924191355577"/>
-        </c:manualLayout>
-      </c:layout>
-      <c:txPr>
-        <a:bodyPr/>
-        <a:lstStyle/>
-        <a:p>
-          <a:pPr>
-            <a:defRPr sz="1000" b="1"/>
-          </a:pPr>
-          <a:endParaRPr lang="en-US"/>
-        </a:p>
-      </c:txPr>
-    </c:legend>
-    <c:plotVisOnly val="1"/>
-  </c:chart>
-  <c:externalData r:id="rId1"/>
-</c:chartSpace>
-</file>
-
-<file path=ppt/charts/chart3.xml><?xml version="1.0" encoding="utf-8"?>
-<c:chartSpace xmlns:c="http://schemas.openxmlformats.org/drawingml/2006/chart" xmlns:a="http://schemas.openxmlformats.org/drawingml/2006/main" xmlns:r="http://schemas.openxmlformats.org/officeDocument/2006/relationships">
-  <c:date1904 val="1"/>
-  <c:lang val="en-US"/>
-  <c:style val="18"/>
-  <c:chart>
-    <c:plotArea>
-      <c:layout/>
-      <c:barChart>
-        <c:barDir val="col"/>
-        <c:grouping val="clustered"/>
-        <c:ser>
-          <c:idx val="0"/>
-          <c:order val="0"/>
-          <c:tx>
-            <c:strRef>
-              <c:f>MemoryUsage!$E$1</c:f>
-              <c:strCache>
-                <c:ptCount val="1"/>
-                <c:pt idx="0">
-                  <c:v>Original</c:v>
-                </c:pt>
-              </c:strCache>
-            </c:strRef>
-          </c:tx>
-          <c:spPr>
-            <a:solidFill>
-              <a:schemeClr val="bg1">
-                <a:lumMod val="65000"/>
-              </a:schemeClr>
-            </a:solidFill>
-          </c:spPr>
-          <c:cat>
-            <c:strRef>
-              <c:f>MemoryUsage!$D$2:$D$21</c:f>
-              <c:strCache>
-                <c:ptCount val="20"/>
-                <c:pt idx="0">
-                  <c:v>Phoenix</c:v>
-                </c:pt>
-                <c:pt idx="1">
-                  <c:v>histogram</c:v>
-                </c:pt>
-                <c:pt idx="2">
-                  <c:v>kmeans</c:v>
-                </c:pt>
-                <c:pt idx="3">
-                  <c:v>linear_regression</c:v>
-                </c:pt>
-                <c:pt idx="4">
-                  <c:v>matrix_multiply</c:v>
-                </c:pt>
-                <c:pt idx="5">
-                  <c:v>pca</c:v>
-                </c:pt>
-                <c:pt idx="6">
-                  <c:v>reverse_index</c:v>
-                </c:pt>
-                <c:pt idx="7">
-                  <c:v>string_match</c:v>
-                </c:pt>
-                <c:pt idx="8">
-                  <c:v>word_count</c:v>
-                </c:pt>
-                <c:pt idx="9">
-                  <c:v>PARSEC</c:v>
-                </c:pt>
-                <c:pt idx="10">
-                  <c:v>blackscholes </c:v>
-                </c:pt>
-                <c:pt idx="11">
-                  <c:v>bodytrack </c:v>
-                </c:pt>
-                <c:pt idx="12">
-                  <c:v>dedup </c:v>
-                </c:pt>
-                <c:pt idx="13">
-                  <c:v>ferret </c:v>
-                </c:pt>
-                <c:pt idx="14">
-                  <c:v>fluidanimate </c:v>
-                </c:pt>
-                <c:pt idx="15">
-                  <c:v>streamcluster </c:v>
-                </c:pt>
-                <c:pt idx="16">
-                  <c:v>swaptions </c:v>
-                </c:pt>
-                <c:pt idx="17">
-                  <c:v>x264 </c:v>
-                </c:pt>
-                <c:pt idx="19">
-                  <c:v>AVERAGE</c:v>
-                </c:pt>
-              </c:strCache>
-            </c:strRef>
-          </c:cat>
-          <c:val>
-            <c:numRef>
-              <c:f>MemoryUsage!$E$2:$E$21</c:f>
-              <c:numCache>
-                <c:formatCode>General</c:formatCode>
-                <c:ptCount val="20"/>
+                <c:ptCount val="27"/>
                 <c:pt idx="1">
                   <c:v>1.0</c:v>
                 </c:pt>
@@ -1331,6 +937,24 @@
                   <c:v>1.0</c:v>
                 </c:pt>
                 <c:pt idx="19">
+                  <c:v>1.0</c:v>
+                </c:pt>
+                <c:pt idx="20">
+                  <c:v>1.0</c:v>
+                </c:pt>
+                <c:pt idx="21">
+                  <c:v>1.0</c:v>
+                </c:pt>
+                <c:pt idx="22">
+                  <c:v>1.0</c:v>
+                </c:pt>
+                <c:pt idx="23">
+                  <c:v>1.0</c:v>
+                </c:pt>
+                <c:pt idx="24">
+                  <c:v>1.0</c:v>
+                </c:pt>
+                <c:pt idx="26">
                   <c:v>1.0</c:v>
                 </c:pt>
               </c:numCache>
@@ -1346,7 +970,7 @@
               <c:strCache>
                 <c:ptCount val="1"/>
                 <c:pt idx="0">
-                  <c:v>DEFAULTS</c:v>
+                  <c:v>PREDATOR</c:v>
                 </c:pt>
               </c:strCache>
             </c:strRef>
@@ -1354,16 +978,16 @@
           <c:spPr>
             <a:solidFill>
               <a:schemeClr val="tx1">
-                <a:lumMod val="75000"/>
-                <a:lumOff val="25000"/>
+                <a:lumMod val="95000"/>
+                <a:lumOff val="5000"/>
               </a:schemeClr>
             </a:solidFill>
           </c:spPr>
           <c:cat>
             <c:strRef>
-              <c:f>MemoryUsage!$D$2:$D$21</c:f>
+              <c:f>MemoryUsage!$D$2:$D$28</c:f>
               <c:strCache>
-                <c:ptCount val="20"/>
+                <c:ptCount val="27"/>
                 <c:pt idx="0">
                   <c:v>Phoenix</c:v>
                 </c:pt>
@@ -1418,7 +1042,28 @@
                 <c:pt idx="17">
                   <c:v>x264 </c:v>
                 </c:pt>
+                <c:pt idx="18">
+                  <c:v>RealApplications</c:v>
+                </c:pt>
                 <c:pt idx="19">
+                  <c:v>aget</c:v>
+                </c:pt>
+                <c:pt idx="20">
+                  <c:v>Boost</c:v>
+                </c:pt>
+                <c:pt idx="21">
+                  <c:v>Memcached</c:v>
+                </c:pt>
+                <c:pt idx="22">
+                  <c:v>MySQL</c:v>
+                </c:pt>
+                <c:pt idx="23">
+                  <c:v>pbzip2</c:v>
+                </c:pt>
+                <c:pt idx="24">
+                  <c:v>pfscan</c:v>
+                </c:pt>
+                <c:pt idx="26">
                   <c:v>AVERAGE</c:v>
                 </c:pt>
               </c:strCache>
@@ -1426,10 +1071,10 @@
           </c:cat>
           <c:val>
             <c:numRef>
-              <c:f>MemoryUsage!$F$2:$F$21</c:f>
+              <c:f>MemoryUsage!$F$2:$F$28</c:f>
               <c:numCache>
                 <c:formatCode>General</c:formatCode>
-                <c:ptCount val="20"/>
+                <c:ptCount val="27"/>
                 <c:pt idx="1">
                   <c:v>1.00074625614805</c:v>
                 </c:pt>
@@ -1479,17 +1124,35 @@
                   <c:v>1.173557607481033</c:v>
                 </c:pt>
                 <c:pt idx="19">
-                  <c:v>1.64607082596945</c:v>
+                  <c:v>6.835761589403973</c:v>
+                </c:pt>
+                <c:pt idx="20">
+                  <c:v>1.419657631096002</c:v>
+                </c:pt>
+                <c:pt idx="21">
+                  <c:v>1.0</c:v>
+                </c:pt>
+                <c:pt idx="22">
+                  <c:v>10.35185129349334</c:v>
+                </c:pt>
+                <c:pt idx="23">
+                  <c:v>1.567336510843775</c:v>
+                </c:pt>
+                <c:pt idx="24">
+                  <c:v>1.116584425310862</c:v>
+                </c:pt>
+                <c:pt idx="26">
+                  <c:v>2.210378393893598</c:v>
                 </c:pt>
               </c:numCache>
             </c:numRef>
           </c:val>
         </c:ser>
-        <c:axId val="225121480"/>
-        <c:axId val="225112568"/>
+        <c:axId val="239101544"/>
+        <c:axId val="239108184"/>
       </c:barChart>
       <c:catAx>
-        <c:axId val="225121480"/>
+        <c:axId val="239101544"/>
         <c:scaling>
           <c:orientation val="minMax"/>
         </c:scaling>
@@ -1505,17 +1168,17 @@
             <a:endParaRPr lang="en-US"/>
           </a:p>
         </c:txPr>
-        <c:crossAx val="225112568"/>
+        <c:crossAx val="239108184"/>
         <c:crosses val="autoZero"/>
         <c:auto val="1"/>
         <c:lblAlgn val="ctr"/>
         <c:lblOffset val="100"/>
       </c:catAx>
       <c:valAx>
-        <c:axId val="225112568"/>
+        <c:axId val="239108184"/>
         <c:scaling>
           <c:orientation val="minMax"/>
-          <c:max val="1.8"/>
+          <c:max val="2.5"/>
           <c:min val="0.0"/>
         </c:scaling>
         <c:axPos val="l"/>
@@ -1527,19 +1190,20 @@
               <a:lstStyle/>
               <a:p>
                 <a:pPr>
-                  <a:defRPr/>
+                  <a:defRPr sz="1200"/>
                 </a:pPr>
                 <a:r>
-                  <a:rPr lang="en-US" dirty="0"/>
+                  <a:rPr lang="en-US" sz="1200"/>
                   <a:t>Normalized Memory Uage</a:t>
                 </a:r>
               </a:p>
             </c:rich>
           </c:tx>
+          <c:layout/>
         </c:title>
         <c:numFmt formatCode="General" sourceLinked="1"/>
         <c:tickLblPos val="nextTo"/>
-        <c:crossAx val="225121480"/>
+        <c:crossAx val="239101544"/>
         <c:crosses val="autoZero"/>
         <c:crossBetween val="between"/>
         <c:majorUnit val="0.5"/>
@@ -1562,7 +1226,324 @@
         <a:lstStyle/>
         <a:p>
           <a:pPr>
-            <a:defRPr b="1" i="0"/>
+            <a:defRPr sz="1200" b="1" i="0"/>
+          </a:pPr>
+          <a:endParaRPr lang="en-US"/>
+        </a:p>
+      </c:txPr>
+    </c:legend>
+    <c:plotVisOnly val="1"/>
+  </c:chart>
+  <c:externalData r:id="rId1"/>
+  <c:userShapes r:id="rId2"/>
+</c:chartSpace>
+</file>
+
+<file path=ppt/charts/chart3.xml><?xml version="1.0" encoding="utf-8"?>
+<c:chartSpace xmlns:c="http://schemas.openxmlformats.org/drawingml/2006/chart" xmlns:a="http://schemas.openxmlformats.org/drawingml/2006/main" xmlns:r="http://schemas.openxmlformats.org/officeDocument/2006/relationships">
+  <c:date1904 val="1"/>
+  <c:lang val="en-US"/>
+  <c:style val="18"/>
+  <c:chart>
+    <c:plotArea>
+      <c:layout/>
+      <c:barChart>
+        <c:barDir val="col"/>
+        <c:grouping val="clustered"/>
+        <c:ser>
+          <c:idx val="0"/>
+          <c:order val="0"/>
+          <c:tx>
+            <c:strRef>
+              <c:f>Sensitivity!$F$1</c:f>
+              <c:strCache>
+                <c:ptCount val="1"/>
+                <c:pt idx="0">
+                  <c:v>SampleRate 0.1%</c:v>
+                </c:pt>
+              </c:strCache>
+            </c:strRef>
+          </c:tx>
+          <c:spPr>
+            <a:solidFill>
+              <a:schemeClr val="bg1">
+                <a:lumMod val="65000"/>
+              </a:schemeClr>
+            </a:solidFill>
+          </c:spPr>
+          <c:cat>
+            <c:strRef>
+              <c:f>Sensitivity!$E$2:$E$8</c:f>
+              <c:strCache>
+                <c:ptCount val="7"/>
+                <c:pt idx="0">
+                  <c:v>histogram</c:v>
+                </c:pt>
+                <c:pt idx="1">
+                  <c:v>linear_regression</c:v>
+                </c:pt>
+                <c:pt idx="2">
+                  <c:v>reverse_index</c:v>
+                </c:pt>
+                <c:pt idx="3">
+                  <c:v>word_count</c:v>
+                </c:pt>
+                <c:pt idx="4">
+                  <c:v>streamcluster</c:v>
+                </c:pt>
+                <c:pt idx="6">
+                  <c:v>AVERAGE</c:v>
+                </c:pt>
+              </c:strCache>
+            </c:strRef>
+          </c:cat>
+          <c:val>
+            <c:numRef>
+              <c:f>Sensitivity!$F$2:$F$8</c:f>
+              <c:numCache>
+                <c:formatCode>General</c:formatCode>
+                <c:ptCount val="7"/>
+                <c:pt idx="0">
+                  <c:v>0.800945598176787</c:v>
+                </c:pt>
+                <c:pt idx="1">
+                  <c:v>0.895040650406504</c:v>
+                </c:pt>
+                <c:pt idx="2">
+                  <c:v>0.958738678295597</c:v>
+                </c:pt>
+                <c:pt idx="3">
+                  <c:v>0.944088120472334</c:v>
+                </c:pt>
+                <c:pt idx="4">
+                  <c:v>1.000976302469158</c:v>
+                </c:pt>
+                <c:pt idx="6">
+                  <c:v>0.919957869964076</c:v>
+                </c:pt>
+              </c:numCache>
+            </c:numRef>
+          </c:val>
+        </c:ser>
+        <c:ser>
+          <c:idx val="1"/>
+          <c:order val="1"/>
+          <c:tx>
+            <c:strRef>
+              <c:f>Sensitivity!$G$1</c:f>
+              <c:strCache>
+                <c:ptCount val="1"/>
+                <c:pt idx="0">
+                  <c:v>Default SampleRate 1%</c:v>
+                </c:pt>
+              </c:strCache>
+            </c:strRef>
+          </c:tx>
+          <c:spPr>
+            <a:solidFill>
+              <a:schemeClr val="tx1">
+                <a:lumMod val="95000"/>
+                <a:lumOff val="5000"/>
+              </a:schemeClr>
+            </a:solidFill>
+          </c:spPr>
+          <c:cat>
+            <c:strRef>
+              <c:f>Sensitivity!$E$2:$E$8</c:f>
+              <c:strCache>
+                <c:ptCount val="7"/>
+                <c:pt idx="0">
+                  <c:v>histogram</c:v>
+                </c:pt>
+                <c:pt idx="1">
+                  <c:v>linear_regression</c:v>
+                </c:pt>
+                <c:pt idx="2">
+                  <c:v>reverse_index</c:v>
+                </c:pt>
+                <c:pt idx="3">
+                  <c:v>word_count</c:v>
+                </c:pt>
+                <c:pt idx="4">
+                  <c:v>streamcluster</c:v>
+                </c:pt>
+                <c:pt idx="6">
+                  <c:v>AVERAGE</c:v>
+                </c:pt>
+              </c:strCache>
+            </c:strRef>
+          </c:cat>
+          <c:val>
+            <c:numRef>
+              <c:f>Sensitivity!$G$2:$G$8</c:f>
+              <c:numCache>
+                <c:formatCode>General</c:formatCode>
+                <c:ptCount val="7"/>
+                <c:pt idx="0">
+                  <c:v>1.0</c:v>
+                </c:pt>
+                <c:pt idx="1">
+                  <c:v>1.0</c:v>
+                </c:pt>
+                <c:pt idx="2">
+                  <c:v>1.0</c:v>
+                </c:pt>
+                <c:pt idx="3">
+                  <c:v>1.0</c:v>
+                </c:pt>
+                <c:pt idx="4">
+                  <c:v>1.0</c:v>
+                </c:pt>
+                <c:pt idx="6">
+                  <c:v>1.0</c:v>
+                </c:pt>
+              </c:numCache>
+            </c:numRef>
+          </c:val>
+        </c:ser>
+        <c:ser>
+          <c:idx val="2"/>
+          <c:order val="2"/>
+          <c:tx>
+            <c:strRef>
+              <c:f>Sensitivity!$H$1</c:f>
+              <c:strCache>
+                <c:ptCount val="1"/>
+                <c:pt idx="0">
+                  <c:v>SampleRate 10%</c:v>
+                </c:pt>
+              </c:strCache>
+            </c:strRef>
+          </c:tx>
+          <c:spPr>
+            <a:solidFill>
+              <a:schemeClr val="tx1">
+                <a:lumMod val="65000"/>
+                <a:lumOff val="35000"/>
+              </a:schemeClr>
+            </a:solidFill>
+          </c:spPr>
+          <c:cat>
+            <c:strRef>
+              <c:f>Sensitivity!$E$2:$E$8</c:f>
+              <c:strCache>
+                <c:ptCount val="7"/>
+                <c:pt idx="0">
+                  <c:v>histogram</c:v>
+                </c:pt>
+                <c:pt idx="1">
+                  <c:v>linear_regression</c:v>
+                </c:pt>
+                <c:pt idx="2">
+                  <c:v>reverse_index</c:v>
+                </c:pt>
+                <c:pt idx="3">
+                  <c:v>word_count</c:v>
+                </c:pt>
+                <c:pt idx="4">
+                  <c:v>streamcluster</c:v>
+                </c:pt>
+                <c:pt idx="6">
+                  <c:v>AVERAGE</c:v>
+                </c:pt>
+              </c:strCache>
+            </c:strRef>
+          </c:cat>
+          <c:val>
+            <c:numRef>
+              <c:f>Sensitivity!$H$2:$H$8</c:f>
+              <c:numCache>
+                <c:formatCode>General</c:formatCode>
+                <c:ptCount val="7"/>
+                <c:pt idx="0">
+                  <c:v>0.993656113457449</c:v>
+                </c:pt>
+                <c:pt idx="1">
+                  <c:v>1.258048780487805</c:v>
+                </c:pt>
+                <c:pt idx="2">
+                  <c:v>0.966202616584812</c:v>
+                </c:pt>
+                <c:pt idx="3">
+                  <c:v>1.025655326267479</c:v>
+                </c:pt>
+                <c:pt idx="4">
+                  <c:v>1.023342504659625</c:v>
+                </c:pt>
+                <c:pt idx="6">
+                  <c:v>1.053381068291434</c:v>
+                </c:pt>
+              </c:numCache>
+            </c:numRef>
+          </c:val>
+        </c:ser>
+        <c:axId val="460059032"/>
+        <c:axId val="230638904"/>
+      </c:barChart>
+      <c:catAx>
+        <c:axId val="460059032"/>
+        <c:scaling>
+          <c:orientation val="minMax"/>
+        </c:scaling>
+        <c:axPos val="b"/>
+        <c:tickLblPos val="nextTo"/>
+        <c:txPr>
+          <a:bodyPr/>
+          <a:lstStyle/>
+          <a:p>
+            <a:pPr>
+              <a:defRPr b="1"/>
+            </a:pPr>
+            <a:endParaRPr lang="en-US"/>
+          </a:p>
+        </c:txPr>
+        <c:crossAx val="230638904"/>
+        <c:crosses val="autoZero"/>
+        <c:auto val="1"/>
+        <c:lblAlgn val="ctr"/>
+        <c:lblOffset val="100"/>
+      </c:catAx>
+      <c:valAx>
+        <c:axId val="230638904"/>
+        <c:scaling>
+          <c:orientation val="minMax"/>
+        </c:scaling>
+        <c:axPos val="l"/>
+        <c:majorGridlines/>
+        <c:title>
+          <c:tx>
+            <c:rich>
+              <a:bodyPr/>
+              <a:lstStyle/>
+              <a:p>
+                <a:pPr>
+                  <a:defRPr sz="1200"/>
+                </a:pPr>
+                <a:r>
+                  <a:rPr lang="en-US" sz="1200"/>
+                  <a:t>Normalized Runtime</a:t>
+                </a:r>
+              </a:p>
+            </c:rich>
+          </c:tx>
+          <c:layout/>
+        </c:title>
+        <c:numFmt formatCode="General" sourceLinked="1"/>
+        <c:tickLblPos val="nextTo"/>
+        <c:crossAx val="460059032"/>
+        <c:crosses val="autoZero"/>
+        <c:crossBetween val="between"/>
+      </c:valAx>
+    </c:plotArea>
+    <c:legend>
+      <c:legendPos val="r"/>
+      <c:layout/>
+      <c:txPr>
+        <a:bodyPr/>
+        <a:lstStyle/>
+        <a:p>
+          <a:pPr>
+            <a:defRPr sz="1200" b="1"/>
           </a:pPr>
           <a:endParaRPr lang="en-US"/>
         </a:p>
@@ -1578,12 +1559,12 @@
 <c:userShapes xmlns:c="http://schemas.openxmlformats.org/drawingml/2006/chart">
   <cdr:relSizeAnchor xmlns:cdr="http://schemas.openxmlformats.org/drawingml/2006/chartDrawing">
     <cdr:from>
-      <cdr:x>0.06439</cdr:x>
-      <cdr:y>0.13489</cdr:y>
+      <cdr:x>0.09637</cdr:x>
+      <cdr:y>0.07188</cdr:y>
     </cdr:from>
     <cdr:to>
-      <cdr:x>0.11869</cdr:x>
-      <cdr:y>0.2488</cdr:y>
+      <cdr:x>0.12466</cdr:x>
+      <cdr:y>0.15389</cdr:y>
     </cdr:to>
     <cdr:sp macro="" textlink="">
       <cdr:nvSpPr>
@@ -1592,8 +1573,8 @@
       </cdr:nvSpPr>
       <cdr:spPr>
         <a:xfrm xmlns:a="http://schemas.openxmlformats.org/drawingml/2006/main">
-          <a:off x="431799" y="381000"/>
-          <a:ext cx="364067" cy="321734"/>
+          <a:off x="749808" y="228600"/>
+          <a:ext cx="220133" cy="260773"/>
         </a:xfrm>
         <a:prstGeom xmlns:a="http://schemas.openxmlformats.org/drawingml/2006/main" prst="rect">
           <a:avLst/>
@@ -1605,7 +1586,7 @@
         <a:p xmlns:a="http://schemas.openxmlformats.org/drawingml/2006/main">
           <a:r>
             <a:rPr lang="en-US" sz="1100" dirty="0" smtClean="0"/>
-            <a:t>23.4</a:t>
+            <a:t>23</a:t>
           </a:r>
           <a:endParaRPr lang="en-US" sz="1100" dirty="0"/>
         </a:p>
@@ -1614,12 +1595,12 @@
   </cdr:relSizeAnchor>
   <cdr:relSizeAnchor xmlns:cdr="http://schemas.openxmlformats.org/drawingml/2006/chartDrawing">
     <cdr:from>
-      <cdr:x>0.11364</cdr:x>
-      <cdr:y>0.06595</cdr:y>
+      <cdr:x>0.14146</cdr:x>
+      <cdr:y>0.04792</cdr:y>
     </cdr:from>
     <cdr:to>
-      <cdr:x>0.17424</cdr:x>
-      <cdr:y>0.15887</cdr:y>
+      <cdr:x>0.17628</cdr:x>
+      <cdr:y>0.14111</cdr:y>
     </cdr:to>
     <cdr:sp macro="" textlink="">
       <cdr:nvSpPr>
@@ -1628,8 +1609,49 @@
       </cdr:nvSpPr>
       <cdr:spPr>
         <a:xfrm xmlns:a="http://schemas.openxmlformats.org/drawingml/2006/main">
-          <a:off x="762000" y="186267"/>
-          <a:ext cx="406400" cy="262467"/>
+          <a:off x="1100667" y="152400"/>
+          <a:ext cx="270933" cy="296334"/>
+        </a:xfrm>
+        <a:prstGeom xmlns:a="http://schemas.openxmlformats.org/drawingml/2006/main" prst="rect">
+          <a:avLst/>
+        </a:prstGeom>
+      </cdr:spPr>
+      <cdr:txBody>
+        <a:bodyPr xmlns:a="http://schemas.openxmlformats.org/drawingml/2006/main" wrap="none" lIns="0" rtlCol="0"/>
+        <a:lstStyle xmlns:a="http://schemas.openxmlformats.org/drawingml/2006/main"/>
+        <a:p xmlns:a="http://schemas.openxmlformats.org/drawingml/2006/main">
+          <a:r>
+            <a:rPr lang="en-US" sz="1100" dirty="0" smtClean="0"/>
+            <a:t>26</a:t>
+          </a:r>
+          <a:endParaRPr lang="en-US" sz="1100" dirty="0"/>
+        </a:p>
+      </cdr:txBody>
+    </cdr:sp>
+  </cdr:relSizeAnchor>
+</c:userShapes>
+</file>
+
+<file path=ppt/drawings/drawing2.xml><?xml version="1.0" encoding="utf-8"?>
+<c:userShapes xmlns:c="http://schemas.openxmlformats.org/drawingml/2006/chart">
+  <cdr:relSizeAnchor xmlns:cdr="http://schemas.openxmlformats.org/drawingml/2006/chartDrawing">
+    <cdr:from>
+      <cdr:x>0.51702</cdr:x>
+      <cdr:y>0.04768</cdr:y>
+    </cdr:from>
+    <cdr:to>
+      <cdr:x>0.57271</cdr:x>
+      <cdr:y>0.15495</cdr:y>
+    </cdr:to>
+    <cdr:sp macro="" textlink="">
+      <cdr:nvSpPr>
+        <cdr:cNvPr id="2" name="TextBox 1"/>
+        <cdr:cNvSpPr txBox="1"/>
+      </cdr:nvSpPr>
+      <cdr:spPr>
+        <a:xfrm xmlns:a="http://schemas.openxmlformats.org/drawingml/2006/main">
+          <a:off x="4032504" y="146931"/>
+          <a:ext cx="434361" cy="330593"/>
         </a:xfrm>
         <a:prstGeom xmlns:a="http://schemas.openxmlformats.org/drawingml/2006/main" prst="rect">
           <a:avLst/>
@@ -1641,7 +1663,175 @@
         <a:p xmlns:a="http://schemas.openxmlformats.org/drawingml/2006/main">
           <a:r>
             <a:rPr lang="en-US" sz="1100" dirty="0" smtClean="0"/>
-            <a:t>26.5</a:t>
+            <a:t>7.8</a:t>
+          </a:r>
+          <a:endParaRPr lang="en-US" sz="1100" dirty="0"/>
+        </a:p>
+      </cdr:txBody>
+    </cdr:sp>
+  </cdr:relSizeAnchor>
+  <cdr:relSizeAnchor xmlns:cdr="http://schemas.openxmlformats.org/drawingml/2006/chartDrawing">
+    <cdr:from>
+      <cdr:x>0.60495</cdr:x>
+      <cdr:y>0.04747</cdr:y>
+    </cdr:from>
+    <cdr:to>
+      <cdr:x>0.66064</cdr:x>
+      <cdr:y>0.15474</cdr:y>
+    </cdr:to>
+    <cdr:sp macro="" textlink="">
+      <cdr:nvSpPr>
+        <cdr:cNvPr id="3" name="TextBox 2"/>
+        <cdr:cNvSpPr txBox="1"/>
+      </cdr:nvSpPr>
+      <cdr:spPr>
+        <a:xfrm xmlns:a="http://schemas.openxmlformats.org/drawingml/2006/main">
+          <a:off x="4718304" y="146304"/>
+          <a:ext cx="434361" cy="330593"/>
+        </a:xfrm>
+        <a:prstGeom xmlns:a="http://schemas.openxmlformats.org/drawingml/2006/main" prst="rect">
+          <a:avLst/>
+        </a:prstGeom>
+      </cdr:spPr>
+      <cdr:txBody>
+        <a:bodyPr xmlns:a="http://schemas.openxmlformats.org/drawingml/2006/main" wrap="none" rtlCol="0"/>
+        <a:lstStyle xmlns:a="http://schemas.openxmlformats.org/drawingml/2006/main">
+          <a:lvl1pPr marL="0" indent="0">
+            <a:defRPr sz="1100">
+              <a:latin typeface="Calibri"/>
+            </a:defRPr>
+          </a:lvl1pPr>
+          <a:lvl2pPr marL="457200" indent="0">
+            <a:defRPr sz="1100">
+              <a:latin typeface="Calibri"/>
+            </a:defRPr>
+          </a:lvl2pPr>
+          <a:lvl3pPr marL="914400" indent="0">
+            <a:defRPr sz="1100">
+              <a:latin typeface="Calibri"/>
+            </a:defRPr>
+          </a:lvl3pPr>
+          <a:lvl4pPr marL="1371600" indent="0">
+            <a:defRPr sz="1100">
+              <a:latin typeface="Calibri"/>
+            </a:defRPr>
+          </a:lvl4pPr>
+          <a:lvl5pPr marL="1828800" indent="0">
+            <a:defRPr sz="1100">
+              <a:latin typeface="Calibri"/>
+            </a:defRPr>
+          </a:lvl5pPr>
+          <a:lvl6pPr marL="2286000" indent="0">
+            <a:defRPr sz="1100">
+              <a:latin typeface="Calibri"/>
+            </a:defRPr>
+          </a:lvl6pPr>
+          <a:lvl7pPr marL="2743200" indent="0">
+            <a:defRPr sz="1100">
+              <a:latin typeface="Calibri"/>
+            </a:defRPr>
+          </a:lvl7pPr>
+          <a:lvl8pPr marL="3200400" indent="0">
+            <a:defRPr sz="1100">
+              <a:latin typeface="Calibri"/>
+            </a:defRPr>
+          </a:lvl8pPr>
+          <a:lvl9pPr marL="3657600" indent="0">
+            <a:defRPr sz="1100">
+              <a:latin typeface="Calibri"/>
+            </a:defRPr>
+          </a:lvl9pPr>
+        </a:lstStyle>
+        <a:p xmlns:a="http://schemas.openxmlformats.org/drawingml/2006/main">
+          <a:r>
+            <a:rPr lang="en-US" sz="1100" dirty="0" smtClean="0"/>
+            <a:t>6.8</a:t>
+          </a:r>
+          <a:endParaRPr lang="en-US" sz="1100" dirty="0"/>
+        </a:p>
+      </cdr:txBody>
+    </cdr:sp>
+  </cdr:relSizeAnchor>
+  <cdr:relSizeAnchor xmlns:cdr="http://schemas.openxmlformats.org/drawingml/2006/chartDrawing">
+    <cdr:from>
+      <cdr:x>0.67998</cdr:x>
+      <cdr:y>0.04747</cdr:y>
+    </cdr:from>
+    <cdr:to>
+      <cdr:x>0.73567</cdr:x>
+      <cdr:y>0.15474</cdr:y>
+    </cdr:to>
+    <cdr:sp macro="" textlink="">
+      <cdr:nvSpPr>
+        <cdr:cNvPr id="4" name="TextBox 3"/>
+        <cdr:cNvSpPr txBox="1"/>
+      </cdr:nvSpPr>
+      <cdr:spPr>
+        <a:xfrm xmlns:a="http://schemas.openxmlformats.org/drawingml/2006/main">
+          <a:off x="5303520" y="146304"/>
+          <a:ext cx="434361" cy="330593"/>
+        </a:xfrm>
+        <a:prstGeom xmlns:a="http://schemas.openxmlformats.org/drawingml/2006/main" prst="rect">
+          <a:avLst/>
+        </a:prstGeom>
+      </cdr:spPr>
+      <cdr:txBody>
+        <a:bodyPr xmlns:a="http://schemas.openxmlformats.org/drawingml/2006/main" wrap="none" rtlCol="0"/>
+        <a:lstStyle xmlns:a="http://schemas.openxmlformats.org/drawingml/2006/main">
+          <a:lvl1pPr marL="0" indent="0">
+            <a:defRPr sz="1100">
+              <a:latin typeface="Calibri"/>
+            </a:defRPr>
+          </a:lvl1pPr>
+          <a:lvl2pPr marL="457200" indent="0">
+            <a:defRPr sz="1100">
+              <a:latin typeface="Calibri"/>
+            </a:defRPr>
+          </a:lvl2pPr>
+          <a:lvl3pPr marL="914400" indent="0">
+            <a:defRPr sz="1100">
+              <a:latin typeface="Calibri"/>
+            </a:defRPr>
+          </a:lvl3pPr>
+          <a:lvl4pPr marL="1371600" indent="0">
+            <a:defRPr sz="1100">
+              <a:latin typeface="Calibri"/>
+            </a:defRPr>
+          </a:lvl4pPr>
+          <a:lvl5pPr marL="1828800" indent="0">
+            <a:defRPr sz="1100">
+              <a:latin typeface="Calibri"/>
+            </a:defRPr>
+          </a:lvl5pPr>
+          <a:lvl6pPr marL="2286000" indent="0">
+            <a:defRPr sz="1100">
+              <a:latin typeface="Calibri"/>
+            </a:defRPr>
+          </a:lvl6pPr>
+          <a:lvl7pPr marL="2743200" indent="0">
+            <a:defRPr sz="1100">
+              <a:latin typeface="Calibri"/>
+            </a:defRPr>
+          </a:lvl7pPr>
+          <a:lvl8pPr marL="3200400" indent="0">
+            <a:defRPr sz="1100">
+              <a:latin typeface="Calibri"/>
+            </a:defRPr>
+          </a:lvl8pPr>
+          <a:lvl9pPr marL="3657600" indent="0">
+            <a:defRPr sz="1100">
+              <a:latin typeface="Calibri"/>
+            </a:defRPr>
+          </a:lvl9pPr>
+        </a:lstStyle>
+        <a:p xmlns:a="http://schemas.openxmlformats.org/drawingml/2006/main">
+          <a:r>
+            <a:rPr lang="en-US" dirty="0" smtClean="0"/>
+            <a:t>10</a:t>
+          </a:r>
+          <a:r>
+            <a:rPr lang="en-US" sz="1100" dirty="0" smtClean="0"/>
+            <a:t>.4</a:t>
           </a:r>
           <a:endParaRPr lang="en-US" sz="1100" dirty="0"/>
         </a:p>
@@ -1833,7 +2023,7 @@
             <a:fld id="{CD9E33B9-CE4A-C84C-B720-FE624F5655F3}" type="datetimeFigureOut">
               <a:rPr lang="en-US" smtClean="0"/>
               <a:pPr/>
-              <a:t>9/12/13</a:t>
+              <a:t>12/6/13</a:t>
             </a:fld>
             <a:endParaRPr lang="en-US" dirty="0"/>
           </a:p>
@@ -2000,7 +2190,7 @@
             <a:fld id="{CD9E33B9-CE4A-C84C-B720-FE624F5655F3}" type="datetimeFigureOut">
               <a:rPr lang="en-US" smtClean="0"/>
               <a:pPr/>
-              <a:t>9/12/13</a:t>
+              <a:t>12/6/13</a:t>
             </a:fld>
             <a:endParaRPr lang="en-US" dirty="0"/>
           </a:p>
@@ -2177,7 +2367,7 @@
             <a:fld id="{CD9E33B9-CE4A-C84C-B720-FE624F5655F3}" type="datetimeFigureOut">
               <a:rPr lang="en-US" smtClean="0"/>
               <a:pPr/>
-              <a:t>9/12/13</a:t>
+              <a:t>12/6/13</a:t>
             </a:fld>
             <a:endParaRPr lang="en-US" dirty="0"/>
           </a:p>
@@ -2344,7 +2534,7 @@
             <a:fld id="{CD9E33B9-CE4A-C84C-B720-FE624F5655F3}" type="datetimeFigureOut">
               <a:rPr lang="en-US" smtClean="0"/>
               <a:pPr/>
-              <a:t>9/12/13</a:t>
+              <a:t>12/6/13</a:t>
             </a:fld>
             <a:endParaRPr lang="en-US" dirty="0"/>
           </a:p>
@@ -2587,7 +2777,7 @@
             <a:fld id="{CD9E33B9-CE4A-C84C-B720-FE624F5655F3}" type="datetimeFigureOut">
               <a:rPr lang="en-US" smtClean="0"/>
               <a:pPr/>
-              <a:t>9/12/13</a:t>
+              <a:t>12/6/13</a:t>
             </a:fld>
             <a:endParaRPr lang="en-US" dirty="0"/>
           </a:p>
@@ -2872,7 +3062,7 @@
             <a:fld id="{CD9E33B9-CE4A-C84C-B720-FE624F5655F3}" type="datetimeFigureOut">
               <a:rPr lang="en-US" smtClean="0"/>
               <a:pPr/>
-              <a:t>9/12/13</a:t>
+              <a:t>12/6/13</a:t>
             </a:fld>
             <a:endParaRPr lang="en-US" dirty="0"/>
           </a:p>
@@ -3291,7 +3481,7 @@
             <a:fld id="{CD9E33B9-CE4A-C84C-B720-FE624F5655F3}" type="datetimeFigureOut">
               <a:rPr lang="en-US" smtClean="0"/>
               <a:pPr/>
-              <a:t>9/12/13</a:t>
+              <a:t>12/6/13</a:t>
             </a:fld>
             <a:endParaRPr lang="en-US" dirty="0"/>
           </a:p>
@@ -3406,7 +3596,7 @@
             <a:fld id="{CD9E33B9-CE4A-C84C-B720-FE624F5655F3}" type="datetimeFigureOut">
               <a:rPr lang="en-US" smtClean="0"/>
               <a:pPr/>
-              <a:t>9/12/13</a:t>
+              <a:t>12/6/13</a:t>
             </a:fld>
             <a:endParaRPr lang="en-US" dirty="0"/>
           </a:p>
@@ -3498,7 +3688,7 @@
             <a:fld id="{CD9E33B9-CE4A-C84C-B720-FE624F5655F3}" type="datetimeFigureOut">
               <a:rPr lang="en-US" smtClean="0"/>
               <a:pPr/>
-              <a:t>9/12/13</a:t>
+              <a:t>12/6/13</a:t>
             </a:fld>
             <a:endParaRPr lang="en-US" dirty="0"/>
           </a:p>
@@ -3772,7 +3962,7 @@
             <a:fld id="{CD9E33B9-CE4A-C84C-B720-FE624F5655F3}" type="datetimeFigureOut">
               <a:rPr lang="en-US" smtClean="0"/>
               <a:pPr/>
-              <a:t>9/12/13</a:t>
+              <a:t>12/6/13</a:t>
             </a:fld>
             <a:endParaRPr lang="en-US" dirty="0"/>
           </a:p>
@@ -4022,7 +4212,7 @@
             <a:fld id="{CD9E33B9-CE4A-C84C-B720-FE624F5655F3}" type="datetimeFigureOut">
               <a:rPr lang="en-US" smtClean="0"/>
               <a:pPr/>
-              <a:t>9/12/13</a:t>
+              <a:t>12/6/13</a:t>
             </a:fld>
             <a:endParaRPr lang="en-US" dirty="0"/>
           </a:p>
@@ -4232,7 +4422,7 @@
             <a:fld id="{CD9E33B9-CE4A-C84C-B720-FE624F5655F3}" type="datetimeFigureOut">
               <a:rPr lang="en-US" smtClean="0"/>
               <a:pPr/>
-              <a:t>9/12/13</a:t>
+              <a:t>12/6/13</a:t>
             </a:fld>
             <a:endParaRPr lang="en-US" dirty="0"/>
           </a:p>
@@ -8450,13 +8640,13 @@
       </p:grpSpPr>
       <p:graphicFrame>
         <p:nvGraphicFramePr>
-          <p:cNvPr id="4" name="Chart 3"/>
+          <p:cNvPr id="3" name="Chart 2"/>
           <p:cNvGraphicFramePr/>
           <p:nvPr/>
         </p:nvGraphicFramePr>
         <p:xfrm>
-          <a:off x="1583267" y="1422400"/>
-          <a:ext cx="6578600" cy="2824480"/>
+          <a:off x="753533" y="1092200"/>
+          <a:ext cx="7780867" cy="3180080"/>
         </p:xfrm>
         <a:graphic>
           <a:graphicData uri="http://schemas.openxmlformats.org/drawingml/2006/chart">
@@ -8489,204 +8679,6 @@
           <a:chExt cx="0" cy="0"/>
         </a:xfrm>
       </p:grpSpPr>
-      <p:graphicFrame>
-        <p:nvGraphicFramePr>
-          <p:cNvPr id="4" name="Chart 3"/>
-          <p:cNvGraphicFramePr/>
-          <p:nvPr/>
-        </p:nvGraphicFramePr>
-        <p:xfrm>
-          <a:off x="1219200" y="2016760"/>
-          <a:ext cx="6705600" cy="2824480"/>
-        </p:xfrm>
-        <a:graphic>
-          <a:graphicData uri="http://schemas.openxmlformats.org/drawingml/2006/chart">
-            <c:chart xmlns:c="http://schemas.openxmlformats.org/drawingml/2006/chart" xmlns:r="http://schemas.openxmlformats.org/officeDocument/2006/relationships" r:id="rId2"/>
-          </a:graphicData>
-        </a:graphic>
-      </p:graphicFrame>
-      <p:sp>
-        <p:nvSpPr>
-          <p:cNvPr id="5" name="TextBox 4"/>
-          <p:cNvSpPr txBox="1"/>
-          <p:nvPr/>
-        </p:nvSpPr>
-        <p:spPr>
-          <a:xfrm>
-            <a:off x="1885851" y="2311395"/>
-            <a:ext cx="357172" cy="321734"/>
-          </a:xfrm>
-          <a:prstGeom prst="rect">
-            <a:avLst/>
-          </a:prstGeom>
-        </p:spPr>
-        <p:txBody>
-          <a:bodyPr wrap="none" rtlCol="0"/>
-          <a:lstStyle>
-            <a:lvl1pPr marL="0" indent="0">
-              <a:defRPr sz="1100">
-                <a:latin typeface="+mn-lt"/>
-                <a:ea typeface="+mn-ea"/>
-                <a:cs typeface="+mn-cs"/>
-              </a:defRPr>
-            </a:lvl1pPr>
-            <a:lvl2pPr marL="457200" indent="0">
-              <a:defRPr sz="1100">
-                <a:latin typeface="+mn-lt"/>
-                <a:ea typeface="+mn-ea"/>
-                <a:cs typeface="+mn-cs"/>
-              </a:defRPr>
-            </a:lvl2pPr>
-            <a:lvl3pPr marL="914400" indent="0">
-              <a:defRPr sz="1100">
-                <a:latin typeface="+mn-lt"/>
-                <a:ea typeface="+mn-ea"/>
-                <a:cs typeface="+mn-cs"/>
-              </a:defRPr>
-            </a:lvl3pPr>
-            <a:lvl4pPr marL="1371600" indent="0">
-              <a:defRPr sz="1100">
-                <a:latin typeface="+mn-lt"/>
-                <a:ea typeface="+mn-ea"/>
-                <a:cs typeface="+mn-cs"/>
-              </a:defRPr>
-            </a:lvl4pPr>
-            <a:lvl5pPr marL="1828800" indent="0">
-              <a:defRPr sz="1100">
-                <a:latin typeface="+mn-lt"/>
-                <a:ea typeface="+mn-ea"/>
-                <a:cs typeface="+mn-cs"/>
-              </a:defRPr>
-            </a:lvl5pPr>
-            <a:lvl6pPr marL="2286000" indent="0">
-              <a:defRPr sz="1100">
-                <a:latin typeface="+mn-lt"/>
-                <a:ea typeface="+mn-ea"/>
-                <a:cs typeface="+mn-cs"/>
-              </a:defRPr>
-            </a:lvl6pPr>
-            <a:lvl7pPr marL="2743200" indent="0">
-              <a:defRPr sz="1100">
-                <a:latin typeface="+mn-lt"/>
-                <a:ea typeface="+mn-ea"/>
-                <a:cs typeface="+mn-cs"/>
-              </a:defRPr>
-            </a:lvl7pPr>
-            <a:lvl8pPr marL="3200400" indent="0">
-              <a:defRPr sz="1100">
-                <a:latin typeface="+mn-lt"/>
-                <a:ea typeface="+mn-ea"/>
-                <a:cs typeface="+mn-cs"/>
-              </a:defRPr>
-            </a:lvl8pPr>
-            <a:lvl9pPr marL="3657600" indent="0">
-              <a:defRPr sz="1100">
-                <a:latin typeface="+mn-lt"/>
-                <a:ea typeface="+mn-ea"/>
-                <a:cs typeface="+mn-cs"/>
-              </a:defRPr>
-            </a:lvl9pPr>
-          </a:lstStyle>
-          <a:p>
-            <a:r>
-              <a:rPr lang="en-US" sz="1100" dirty="0" smtClean="0"/>
-              <a:t>23.4</a:t>
-            </a:r>
-            <a:endParaRPr lang="en-US" sz="1100" dirty="0"/>
-          </a:p>
-        </p:txBody>
-      </p:sp>
-      <p:sp>
-        <p:nvSpPr>
-          <p:cNvPr id="6" name="TextBox 5"/>
-          <p:cNvSpPr txBox="1"/>
-          <p:nvPr/>
-        </p:nvSpPr>
-        <p:spPr>
-          <a:xfrm>
-            <a:off x="2209798" y="2133596"/>
-            <a:ext cx="398703" cy="262467"/>
-          </a:xfrm>
-          <a:prstGeom prst="rect">
-            <a:avLst/>
-          </a:prstGeom>
-        </p:spPr>
-        <p:txBody>
-          <a:bodyPr wrap="none" rtlCol="0"/>
-          <a:lstStyle>
-            <a:lvl1pPr marL="0" indent="0">
-              <a:defRPr sz="1100">
-                <a:latin typeface="+mn-lt"/>
-                <a:ea typeface="+mn-ea"/>
-                <a:cs typeface="+mn-cs"/>
-              </a:defRPr>
-            </a:lvl1pPr>
-            <a:lvl2pPr marL="457200" indent="0">
-              <a:defRPr sz="1100">
-                <a:latin typeface="+mn-lt"/>
-                <a:ea typeface="+mn-ea"/>
-                <a:cs typeface="+mn-cs"/>
-              </a:defRPr>
-            </a:lvl2pPr>
-            <a:lvl3pPr marL="914400" indent="0">
-              <a:defRPr sz="1100">
-                <a:latin typeface="+mn-lt"/>
-                <a:ea typeface="+mn-ea"/>
-                <a:cs typeface="+mn-cs"/>
-              </a:defRPr>
-            </a:lvl3pPr>
-            <a:lvl4pPr marL="1371600" indent="0">
-              <a:defRPr sz="1100">
-                <a:latin typeface="+mn-lt"/>
-                <a:ea typeface="+mn-ea"/>
-                <a:cs typeface="+mn-cs"/>
-              </a:defRPr>
-            </a:lvl4pPr>
-            <a:lvl5pPr marL="1828800" indent="0">
-              <a:defRPr sz="1100">
-                <a:latin typeface="+mn-lt"/>
-                <a:ea typeface="+mn-ea"/>
-                <a:cs typeface="+mn-cs"/>
-              </a:defRPr>
-            </a:lvl5pPr>
-            <a:lvl6pPr marL="2286000" indent="0">
-              <a:defRPr sz="1100">
-                <a:latin typeface="+mn-lt"/>
-                <a:ea typeface="+mn-ea"/>
-                <a:cs typeface="+mn-cs"/>
-              </a:defRPr>
-            </a:lvl6pPr>
-            <a:lvl7pPr marL="2743200" indent="0">
-              <a:defRPr sz="1100">
-                <a:latin typeface="+mn-lt"/>
-                <a:ea typeface="+mn-ea"/>
-                <a:cs typeface="+mn-cs"/>
-              </a:defRPr>
-            </a:lvl7pPr>
-            <a:lvl8pPr marL="3200400" indent="0">
-              <a:defRPr sz="1100">
-                <a:latin typeface="+mn-lt"/>
-                <a:ea typeface="+mn-ea"/>
-                <a:cs typeface="+mn-cs"/>
-              </a:defRPr>
-            </a:lvl8pPr>
-            <a:lvl9pPr marL="3657600" indent="0">
-              <a:defRPr sz="1100">
-                <a:latin typeface="+mn-lt"/>
-                <a:ea typeface="+mn-ea"/>
-                <a:cs typeface="+mn-cs"/>
-              </a:defRPr>
-            </a:lvl9pPr>
-          </a:lstStyle>
-          <a:p>
-            <a:r>
-              <a:rPr lang="en-US" sz="1100" dirty="0" smtClean="0"/>
-              <a:t>26.5</a:t>
-            </a:r>
-            <a:endParaRPr lang="en-US" sz="1100" dirty="0"/>
-          </a:p>
-        </p:txBody>
-      </p:sp>
     </p:spTree>
   </p:cSld>
   <p:clrMapOvr>
@@ -9565,68 +9557,63 @@
           <a:chExt cx="0" cy="0"/>
         </a:xfrm>
       </p:grpSpPr>
-      <p:grpSp>
-        <p:nvGrpSpPr>
-          <p:cNvPr id="6" name="Group 5"/>
-          <p:cNvGrpSpPr/>
+      <p:graphicFrame>
+        <p:nvGraphicFramePr>
+          <p:cNvPr id="10" name="Chart 9"/>
+          <p:cNvGraphicFramePr/>
           <p:nvPr/>
-        </p:nvGrpSpPr>
-        <p:grpSpPr>
-          <a:xfrm>
-            <a:off x="357294" y="726440"/>
-            <a:ext cx="6126480" cy="2702560"/>
-            <a:chOff x="357294" y="726440"/>
-            <a:chExt cx="6126480" cy="2702560"/>
-          </a:xfrm>
-        </p:grpSpPr>
-        <p:graphicFrame>
-          <p:nvGraphicFramePr>
-            <p:cNvPr id="4" name="Chart 3"/>
-            <p:cNvGraphicFramePr/>
-            <p:nvPr/>
-          </p:nvGraphicFramePr>
-          <p:xfrm>
-            <a:off x="357294" y="726440"/>
-            <a:ext cx="6126480" cy="2702560"/>
-          </p:xfrm>
-          <a:graphic>
-            <a:graphicData uri="http://schemas.openxmlformats.org/drawingml/2006/chart">
-              <c:chart xmlns:c="http://schemas.openxmlformats.org/drawingml/2006/chart" xmlns:r="http://schemas.openxmlformats.org/officeDocument/2006/relationships" r:id="rId2"/>
-            </a:graphicData>
-          </a:graphic>
-        </p:graphicFrame>
-        <p:sp>
-          <p:nvSpPr>
-            <p:cNvPr id="5" name="TextBox 4"/>
-            <p:cNvSpPr txBox="1"/>
-            <p:nvPr/>
-          </p:nvSpPr>
-          <p:spPr>
-            <a:xfrm>
-              <a:off x="4656710" y="863622"/>
-              <a:ext cx="245533" cy="276999"/>
-            </a:xfrm>
-            <a:prstGeom prst="rect">
-              <a:avLst/>
-            </a:prstGeom>
-            <a:noFill/>
-          </p:spPr>
-          <p:txBody>
-            <a:bodyPr wrap="square" lIns="0" rIns="0" rtlCol="0">
-              <a:spAutoFit/>
-            </a:bodyPr>
-            <a:lstStyle/>
-            <a:p>
-              <a:pPr algn="ctr"/>
-              <a:r>
-                <a:rPr lang="en-US" sz="1200" dirty="0" smtClean="0"/>
-                <a:t>7.8</a:t>
-              </a:r>
-              <a:endParaRPr lang="en-US" sz="1200" dirty="0"/>
-            </a:p>
-          </p:txBody>
-        </p:sp>
-      </p:grpSp>
+        </p:nvGraphicFramePr>
+        <p:xfrm>
+          <a:off x="372533" y="1938867"/>
+          <a:ext cx="7799494" cy="3081866"/>
+        </p:xfrm>
+        <a:graphic>
+          <a:graphicData uri="http://schemas.openxmlformats.org/drawingml/2006/chart">
+            <c:chart xmlns:c="http://schemas.openxmlformats.org/drawingml/2006/chart" xmlns:r="http://schemas.openxmlformats.org/officeDocument/2006/relationships" r:id="rId2"/>
+          </a:graphicData>
+        </a:graphic>
+      </p:graphicFrame>
+    </p:spTree>
+  </p:cSld>
+  <p:clrMapOvr>
+    <a:masterClrMapping/>
+  </p:clrMapOvr>
+</p:sld>
+</file>
+
+<file path=ppt/slides/slide7.xml><?xml version="1.0" encoding="utf-8"?>
+<p:sld xmlns:a="http://schemas.openxmlformats.org/drawingml/2006/main" xmlns:r="http://schemas.openxmlformats.org/officeDocument/2006/relationships" xmlns:mc="http://schemas.openxmlformats.org/markup-compatibility/2006" xmlns:mv="urn:schemas-microsoft-com:mac:vml" xmlns:p="http://schemas.openxmlformats.org/presentationml/2006/main" mc:Ignorable="mv" mc:PreserveAttributes="mv:*">
+  <p:cSld>
+    <p:spTree>
+      <p:nvGrpSpPr>
+        <p:cNvPr id="1" name=""/>
+        <p:cNvGrpSpPr/>
+        <p:nvPr/>
+      </p:nvGrpSpPr>
+      <p:grpSpPr>
+        <a:xfrm>
+          <a:off x="0" y="0"/>
+          <a:ext cx="0" cy="0"/>
+          <a:chOff x="0" y="0"/>
+          <a:chExt cx="0" cy="0"/>
+        </a:xfrm>
+      </p:grpSpPr>
+      <p:graphicFrame>
+        <p:nvGraphicFramePr>
+          <p:cNvPr id="4" name="Chart 3"/>
+          <p:cNvGraphicFramePr/>
+          <p:nvPr/>
+        </p:nvGraphicFramePr>
+        <p:xfrm>
+          <a:off x="1327150" y="1176867"/>
+          <a:ext cx="5219700" cy="2743200"/>
+        </p:xfrm>
+        <a:graphic>
+          <a:graphicData uri="http://schemas.openxmlformats.org/drawingml/2006/chart">
+            <c:chart xmlns:c="http://schemas.openxmlformats.org/drawingml/2006/chart" xmlns:r="http://schemas.openxmlformats.org/officeDocument/2006/relationships" r:id="rId2"/>
+          </a:graphicData>
+        </a:graphic>
+      </p:graphicFrame>
     </p:spTree>
   </p:cSld>
   <p:clrMapOvr>

</xml_diff>